<commit_message>
Update documentation for branch main
</commit_message>
<xml_diff>
--- a/main/images/overview.pptx
+++ b/main/images/overview.pptx
@@ -5,10 +5,10 @@
     <p:sldMasterId id="2147483661" r:id="rId1"/>
   </p:sldMasterIdLst>
   <p:notesMasterIdLst>
-    <p:notesMasterId r:id="rId14"/>
+    <p:notesMasterId r:id="rId15"/>
   </p:notesMasterIdLst>
   <p:handoutMasterIdLst>
-    <p:handoutMasterId r:id="rId15"/>
+    <p:handoutMasterId r:id="rId16"/>
   </p:handoutMasterIdLst>
   <p:sldIdLst>
     <p:sldId id="2147476961" r:id="rId2"/>
@@ -23,6 +23,7 @@
     <p:sldId id="2145705721" r:id="rId11"/>
     <p:sldId id="2145705723" r:id="rId12"/>
     <p:sldId id="2123260229" r:id="rId13"/>
+    <p:sldId id="2147476967" r:id="rId14"/>
   </p:sldIdLst>
   <p:sldSz cx="12192000" cy="6858000"/>
   <p:notesSz cx="6858000" cy="9144000"/>
@@ -270,7 +271,7 @@
           <a:p>
             <a:fld id="{008FFADC-39A7-449E-8C68-8776E6FB3C1A}" type="datetimeFigureOut">
               <a:rPr lang="en-GB" smtClean="0"/>
-              <a:t>10/03/2025</a:t>
+              <a:t>11/04/2025</a:t>
             </a:fld>
             <a:endParaRPr lang="en-GB"/>
           </a:p>
@@ -447,7 +448,7 @@
           <a:p>
             <a:fld id="{30B9BAAB-B703-4BB5-9D08-B460FC03C23A}" type="datetimeFigureOut">
               <a:rPr lang="en-GB" smtClean="0"/>
-              <a:t>10/03/2025</a:t>
+              <a:t>11/04/2025</a:t>
             </a:fld>
             <a:endParaRPr lang="en-GB"/>
           </a:p>
@@ -15010,7 +15011,7 @@
               <a:defRPr/>
             </a:pPr>
             <a:r>
-              <a:rPr lang="en-US" sz="1400">
+              <a:rPr lang="en-US" sz="1400" dirty="0">
                 <a:solidFill>
                   <a:schemeClr val="bg2">
                     <a:lumMod val="25000"/>
@@ -15040,7 +15041,7 @@
               <a:defRPr/>
             </a:pPr>
             <a:r>
-              <a:rPr kumimoji="0" lang="en-US" sz="1200" b="0" i="0" u="none" strike="noStrike" kern="1200" cap="none" spc="0" normalizeH="0" baseline="0" noProof="0">
+              <a:rPr kumimoji="0" lang="en-US" sz="1200" b="0" i="0" u="none" strike="noStrike" kern="1200" cap="none" spc="0" normalizeH="0" baseline="0" noProof="0" dirty="0">
                 <a:ln>
                   <a:noFill/>
                 </a:ln>
@@ -15056,10 +15057,10 @@
                 <a:ea typeface="+mn-ea"/>
                 <a:cs typeface="+mn-cs"/>
               </a:rPr>
-              <a:t>*.</a:t>
-            </a:r>
-            <a:r>
-              <a:rPr kumimoji="0" lang="en-US" sz="1200" b="0" i="0" u="none" strike="noStrike" kern="1200" cap="none" spc="0" normalizeH="0" baseline="0" noProof="0" err="1">
+              <a:t>gyroscope.*.</a:t>
+            </a:r>
+            <a:r>
+              <a:rPr kumimoji="0" lang="en-US" sz="1200" b="0" i="0" u="none" strike="noStrike" kern="1200" cap="none" spc="0" normalizeH="0" baseline="0" noProof="0" dirty="0" err="1">
                 <a:ln>
                   <a:noFill/>
                 </a:ln>
@@ -15075,10 +15076,10 @@
                 <a:ea typeface="+mn-ea"/>
                 <a:cs typeface="+mn-cs"/>
               </a:rPr>
-              <a:t>gyroscope.sds</a:t>
+              <a:t>sds</a:t>
             </a:r>
             <a:br>
-              <a:rPr kumimoji="0" lang="en-US" sz="1200" b="0" i="0" u="none" strike="noStrike" kern="1200" cap="none" spc="0" normalizeH="0" baseline="0" noProof="0">
+              <a:rPr kumimoji="0" lang="en-US" sz="1200" b="0" i="0" u="none" strike="noStrike" kern="1200" cap="none" spc="0" normalizeH="0" baseline="0" noProof="0" dirty="0">
                 <a:ln>
                   <a:noFill/>
                 </a:ln>
@@ -15095,7 +15096,7 @@
                 <a:cs typeface="+mn-cs"/>
               </a:rPr>
             </a:br>
-            <a:endParaRPr kumimoji="0" lang="en-GB" sz="1000" b="0" i="0" u="none" strike="noStrike" kern="1200" cap="none" spc="0" normalizeH="0" baseline="0" noProof="0">
+            <a:endParaRPr kumimoji="0" lang="en-GB" sz="1000" b="0" i="0" u="none" strike="noStrike" kern="1200" cap="none" spc="0" normalizeH="0" baseline="0" noProof="0" dirty="0">
               <a:ln>
                 <a:noFill/>
               </a:ln>
@@ -15626,7 +15627,7 @@
               <a:defRPr/>
             </a:pPr>
             <a:r>
-              <a:rPr lang="en-US" sz="1400">
+              <a:rPr lang="en-US" sz="1400" dirty="0">
                 <a:solidFill>
                   <a:schemeClr val="bg2">
                     <a:lumMod val="25000"/>
@@ -15656,7 +15657,7 @@
               <a:defRPr/>
             </a:pPr>
             <a:r>
-              <a:rPr kumimoji="0" lang="en-US" sz="1200" b="0" i="0" u="none" strike="noStrike" kern="1200" cap="none" spc="0" normalizeH="0" baseline="0" noProof="0">
+              <a:rPr kumimoji="0" lang="en-US" sz="1200" b="0" i="0" u="none" strike="noStrike" kern="1200" cap="none" spc="0" normalizeH="0" baseline="0" noProof="0" dirty="0">
                 <a:ln>
                   <a:noFill/>
                 </a:ln>
@@ -15672,10 +15673,10 @@
                 <a:ea typeface="+mn-ea"/>
                 <a:cs typeface="+mn-cs"/>
               </a:rPr>
-              <a:t>*.</a:t>
-            </a:r>
-            <a:r>
-              <a:rPr kumimoji="0" lang="en-US" sz="1200" b="0" i="0" u="none" strike="noStrike" kern="1200" cap="none" spc="0" normalizeH="0" baseline="0" noProof="0" err="1">
+              <a:t>microphone.*.</a:t>
+            </a:r>
+            <a:r>
+              <a:rPr kumimoji="0" lang="en-US" sz="1200" b="0" i="0" u="none" strike="noStrike" kern="1200" cap="none" spc="0" normalizeH="0" baseline="0" noProof="0" dirty="0" err="1">
                 <a:ln>
                   <a:noFill/>
                 </a:ln>
@@ -15691,10 +15692,10 @@
                 <a:ea typeface="+mn-ea"/>
                 <a:cs typeface="+mn-cs"/>
               </a:rPr>
-              <a:t>microphone.sds</a:t>
+              <a:t>sds</a:t>
             </a:r>
             <a:br>
-              <a:rPr kumimoji="0" lang="en-US" sz="1200" b="0" i="0" u="none" strike="noStrike" kern="1200" cap="none" spc="0" normalizeH="0" baseline="0" noProof="0">
+              <a:rPr kumimoji="0" lang="en-US" sz="1200" b="0" i="0" u="none" strike="noStrike" kern="1200" cap="none" spc="0" normalizeH="0" baseline="0" noProof="0" dirty="0">
                 <a:ln>
                   <a:noFill/>
                 </a:ln>
@@ -15711,7 +15712,7 @@
                 <a:cs typeface="+mn-cs"/>
               </a:rPr>
             </a:br>
-            <a:endParaRPr kumimoji="0" lang="en-GB" sz="1000" b="0" i="0" u="none" strike="noStrike" kern="1200" cap="none" spc="0" normalizeH="0" baseline="0" noProof="0">
+            <a:endParaRPr kumimoji="0" lang="en-GB" sz="1000" b="0" i="0" u="none" strike="noStrike" kern="1200" cap="none" spc="0" normalizeH="0" baseline="0" noProof="0" dirty="0">
               <a:ln>
                 <a:noFill/>
               </a:ln>
@@ -16728,7 +16729,7 @@
               <a:defRPr/>
             </a:pPr>
             <a:r>
-              <a:rPr lang="en-US" sz="1400">
+              <a:rPr lang="en-US" sz="1400" dirty="0">
                 <a:solidFill>
                   <a:schemeClr val="bg2">
                     <a:lumMod val="25000"/>
@@ -16758,7 +16759,7 @@
               <a:defRPr/>
             </a:pPr>
             <a:r>
-              <a:rPr kumimoji="0" lang="en-US" sz="1200" b="0" i="0" u="none" strike="noStrike" kern="1200" cap="none" spc="0" normalizeH="0" baseline="0" noProof="0">
+              <a:rPr kumimoji="0" lang="en-US" sz="1200" b="0" i="0" u="none" strike="noStrike" kern="1200" cap="none" spc="0" normalizeH="0" baseline="0" noProof="0" dirty="0">
                 <a:ln>
                   <a:noFill/>
                 </a:ln>
@@ -16774,10 +16775,21 @@
                 <a:ea typeface="+mn-ea"/>
                 <a:cs typeface="+mn-cs"/>
               </a:rPr>
+              <a:t>gyroscope.</a:t>
+            </a:r>
+            <a:r>
+              <a:rPr lang="en-US" sz="1200" dirty="0">
+                <a:solidFill>
+                  <a:schemeClr val="bg2">
+                    <a:lumMod val="25000"/>
+                  </a:schemeClr>
+                </a:solidFill>
+                <a:latin typeface="Calibri"/>
+              </a:rPr>
               <a:t>*.</a:t>
             </a:r>
             <a:r>
-              <a:rPr kumimoji="0" lang="en-US" sz="1200" b="0" i="0" u="none" strike="noStrike" kern="1200" cap="none" spc="0" normalizeH="0" baseline="0" noProof="0" err="1">
+              <a:rPr kumimoji="0" lang="en-US" sz="1200" b="0" i="0" u="none" strike="noStrike" kern="1200" cap="none" spc="0" normalizeH="0" baseline="0" noProof="0" dirty="0" err="1">
                 <a:ln>
                   <a:noFill/>
                 </a:ln>
@@ -16793,10 +16805,10 @@
                 <a:ea typeface="+mn-ea"/>
                 <a:cs typeface="+mn-cs"/>
               </a:rPr>
-              <a:t>gyroscope.sds</a:t>
+              <a:t>sds</a:t>
             </a:r>
             <a:br>
-              <a:rPr kumimoji="0" lang="en-US" sz="1200" b="0" i="0" u="none" strike="noStrike" kern="1200" cap="none" spc="0" normalizeH="0" baseline="0" noProof="0">
+              <a:rPr kumimoji="0" lang="en-US" sz="1200" b="0" i="0" u="none" strike="noStrike" kern="1200" cap="none" spc="0" normalizeH="0" baseline="0" noProof="0" dirty="0">
                 <a:ln>
                   <a:noFill/>
                 </a:ln>
@@ -16813,7 +16825,7 @@
                 <a:cs typeface="+mn-cs"/>
               </a:rPr>
             </a:br>
-            <a:endParaRPr kumimoji="0" lang="en-GB" sz="1000" b="0" i="0" u="none" strike="noStrike" kern="1200" cap="none" spc="0" normalizeH="0" baseline="0" noProof="0">
+            <a:endParaRPr kumimoji="0" lang="en-GB" sz="1000" b="0" i="0" u="none" strike="noStrike" kern="1200" cap="none" spc="0" normalizeH="0" baseline="0" noProof="0" dirty="0">
               <a:ln>
                 <a:noFill/>
               </a:ln>
@@ -16899,7 +16911,7 @@
               <a:defRPr/>
             </a:pPr>
             <a:r>
-              <a:rPr lang="en-US" sz="1400">
+              <a:rPr lang="en-US" sz="1400" dirty="0">
                 <a:solidFill>
                   <a:schemeClr val="bg2">
                     <a:lumMod val="25000"/>
@@ -16929,7 +16941,7 @@
               <a:defRPr/>
             </a:pPr>
             <a:r>
-              <a:rPr kumimoji="0" lang="en-US" sz="1200" b="0" i="0" u="none" strike="noStrike" kern="1200" cap="none" spc="0" normalizeH="0" baseline="0" noProof="0">
+              <a:rPr kumimoji="0" lang="en-US" sz="1200" b="0" i="0" u="none" strike="noStrike" kern="1200" cap="none" spc="0" normalizeH="0" baseline="0" noProof="0" dirty="0">
                 <a:ln>
                   <a:noFill/>
                 </a:ln>
@@ -16945,10 +16957,10 @@
                 <a:ea typeface="+mn-ea"/>
                 <a:cs typeface="+mn-cs"/>
               </a:rPr>
-              <a:t>*.</a:t>
-            </a:r>
-            <a:r>
-              <a:rPr kumimoji="0" lang="en-US" sz="1200" b="0" i="0" u="none" strike="noStrike" kern="1200" cap="none" spc="0" normalizeH="0" baseline="0" noProof="0" err="1">
+              <a:t>microphone.*.</a:t>
+            </a:r>
+            <a:r>
+              <a:rPr kumimoji="0" lang="en-US" sz="1200" b="0" i="0" u="none" strike="noStrike" kern="1200" cap="none" spc="0" normalizeH="0" baseline="0" noProof="0" dirty="0" err="1">
                 <a:ln>
                   <a:noFill/>
                 </a:ln>
@@ -16964,10 +16976,10 @@
                 <a:ea typeface="+mn-ea"/>
                 <a:cs typeface="+mn-cs"/>
               </a:rPr>
-              <a:t>microphone.sds</a:t>
+              <a:t>sds</a:t>
             </a:r>
             <a:br>
-              <a:rPr kumimoji="0" lang="en-US" sz="1200" b="0" i="0" u="none" strike="noStrike" kern="1200" cap="none" spc="0" normalizeH="0" baseline="0" noProof="0">
+              <a:rPr kumimoji="0" lang="en-US" sz="1200" b="0" i="0" u="none" strike="noStrike" kern="1200" cap="none" spc="0" normalizeH="0" baseline="0" noProof="0" dirty="0">
                 <a:ln>
                   <a:noFill/>
                 </a:ln>
@@ -16984,7 +16996,7 @@
                 <a:cs typeface="+mn-cs"/>
               </a:rPr>
             </a:br>
-            <a:endParaRPr kumimoji="0" lang="en-GB" sz="1000" b="0" i="0" u="none" strike="noStrike" kern="1200" cap="none" spc="0" normalizeH="0" baseline="0" noProof="0">
+            <a:endParaRPr kumimoji="0" lang="en-GB" sz="1000" b="0" i="0" u="none" strike="noStrike" kern="1200" cap="none" spc="0" normalizeH="0" baseline="0" noProof="0" dirty="0">
               <a:ln>
                 <a:noFill/>
               </a:ln>
@@ -18029,7 +18041,7 @@
               <a:defRPr/>
             </a:pPr>
             <a:r>
-              <a:rPr kumimoji="0" lang="en-US" sz="1200" b="0" i="0" u="none" strike="noStrike" kern="1200" cap="none" spc="0" normalizeH="0" baseline="0" noProof="0">
+              <a:rPr kumimoji="0" lang="en-US" sz="1200" b="0" i="0" u="none" strike="noStrike" kern="1200" cap="none" spc="0" normalizeH="0" baseline="0" noProof="0" dirty="0">
                 <a:ln>
                   <a:noFill/>
                 </a:ln>
@@ -18048,7 +18060,7 @@
               <a:t>*.</a:t>
             </a:r>
             <a:r>
-              <a:rPr kumimoji="0" lang="en-US" sz="1200" b="0" i="0" u="none" strike="noStrike" kern="1200" cap="none" spc="0" normalizeH="0" baseline="0" noProof="0" err="1">
+              <a:rPr kumimoji="0" lang="en-US" sz="1200" b="0" i="0" u="none" strike="noStrike" kern="1200" cap="none" spc="0" normalizeH="0" baseline="0" noProof="0" dirty="0" err="1">
                 <a:ln>
                   <a:noFill/>
                 </a:ln>
@@ -18067,7 +18079,7 @@
               <a:t>sds</a:t>
             </a:r>
             <a:r>
-              <a:rPr kumimoji="0" lang="en-US" sz="1200" b="0" i="0" u="none" strike="noStrike" kern="1200" cap="none" spc="0" normalizeH="0" baseline="0" noProof="0">
+              <a:rPr kumimoji="0" lang="en-US" sz="1200" b="0" i="0" u="none" strike="noStrike" kern="1200" cap="none" spc="0" normalizeH="0" baseline="0" noProof="0" dirty="0">
                 <a:ln>
                   <a:noFill/>
                 </a:ln>
@@ -18086,7 +18098,7 @@
               <a:t> Data Files</a:t>
             </a:r>
             <a:br>
-              <a:rPr kumimoji="0" lang="en-US" sz="1200" b="0" i="0" u="none" strike="noStrike" kern="1200" cap="none" spc="0" normalizeH="0" baseline="0" noProof="0">
+              <a:rPr kumimoji="0" lang="en-US" sz="1200" b="0" i="0" u="none" strike="noStrike" kern="1200" cap="none" spc="0" normalizeH="0" baseline="0" noProof="0" dirty="0">
                 <a:ln>
                   <a:noFill/>
                 </a:ln>
@@ -18104,7 +18116,7 @@
               </a:rPr>
             </a:br>
             <a:r>
-              <a:rPr kumimoji="0" lang="en-US" sz="1200" b="0" i="0" u="none" strike="noStrike" kern="1200" cap="none" spc="0" normalizeH="0" baseline="0" noProof="0">
+              <a:rPr kumimoji="0" lang="en-US" sz="1200" b="0" i="0" u="none" strike="noStrike" kern="1200" cap="none" spc="0" normalizeH="0" baseline="0" noProof="0" dirty="0">
                 <a:ln>
                   <a:noFill/>
                 </a:ln>
@@ -18120,10 +18132,10 @@
                 <a:ea typeface="+mn-ea"/>
                 <a:cs typeface="+mn-cs"/>
               </a:rPr>
-              <a:t>‘</a:t>
-            </a:r>
-            <a:r>
-              <a:rPr lang="en-US" sz="1000">
+              <a:t>‘s</a:t>
+            </a:r>
+            <a:r>
+              <a:rPr lang="en-US" sz="1000" dirty="0">
                 <a:solidFill>
                   <a:schemeClr val="bg2">
                     <a:lumMod val="25000"/>
@@ -18131,10 +18143,10 @@
                 </a:solidFill>
                 <a:latin typeface="Calibri"/>
               </a:rPr>
-              <a:t>file0.sensorX.sds’</a:t>
+              <a:t>ensorX.0.sds’</a:t>
             </a:r>
             <a:br>
-              <a:rPr lang="en-US" sz="1000">
+              <a:rPr lang="en-US" sz="1000" dirty="0">
                 <a:solidFill>
                   <a:schemeClr val="bg2">
                     <a:lumMod val="25000"/>
@@ -18144,7 +18156,7 @@
               </a:rPr>
             </a:br>
             <a:r>
-              <a:rPr lang="en-US" sz="1000">
+              <a:rPr lang="en-US" sz="1000" dirty="0">
                 <a:solidFill>
                   <a:schemeClr val="bg2">
                     <a:lumMod val="25000"/>
@@ -18152,9 +18164,9 @@
                 </a:solidFill>
                 <a:latin typeface="Calibri"/>
               </a:rPr>
-              <a:t>‘file1.sensorX.sds’</a:t>
-            </a:r>
-            <a:endParaRPr kumimoji="0" lang="en-US" sz="1000" b="0" i="0" u="none" strike="noStrike" kern="1200" cap="none" spc="0" normalizeH="0" baseline="0" noProof="0">
+              <a:t>‘sensorX.1.sds’</a:t>
+            </a:r>
+            <a:endParaRPr kumimoji="0" lang="en-US" sz="1000" b="0" i="0" u="none" strike="noStrike" kern="1200" cap="none" spc="0" normalizeH="0" baseline="0" noProof="0" dirty="0">
               <a:ln>
                 <a:noFill/>
               </a:ln>
@@ -18498,6 +18510,329 @@
     <p:extLst>
       <p:ext uri="{BB962C8B-B14F-4D97-AF65-F5344CB8AC3E}">
         <p14:creationId xmlns:p14="http://schemas.microsoft.com/office/powerpoint/2010/main" val="2773656820"/>
+      </p:ext>
+    </p:extLst>
+  </p:cSld>
+  <p:clrMapOvr>
+    <a:masterClrMapping/>
+  </p:clrMapOvr>
+</p:sld>
+</file>
+
+<file path=ppt/slides/slide13.xml><?xml version="1.0" encoding="utf-8"?>
+<p:sld xmlns:a="http://schemas.openxmlformats.org/drawingml/2006/main" xmlns:r="http://schemas.openxmlformats.org/officeDocument/2006/relationships" xmlns:p="http://schemas.openxmlformats.org/presentationml/2006/main">
+  <p:cSld>
+    <p:spTree>
+      <p:nvGrpSpPr>
+        <p:cNvPr id="1" name=""/>
+        <p:cNvGrpSpPr/>
+        <p:nvPr/>
+      </p:nvGrpSpPr>
+      <p:grpSpPr>
+        <a:xfrm>
+          <a:off x="0" y="0"/>
+          <a:ext cx="0" cy="0"/>
+          <a:chOff x="0" y="0"/>
+          <a:chExt cx="0" cy="0"/>
+        </a:xfrm>
+      </p:grpSpPr>
+      <p:sp>
+        <p:nvSpPr>
+          <p:cNvPr id="7" name="Flowchart: Multidocument 6">
+            <a:extLst>
+              <a:ext uri="{FF2B5EF4-FFF2-40B4-BE49-F238E27FC236}">
+                <a16:creationId xmlns:a16="http://schemas.microsoft.com/office/drawing/2014/main" id="{9D178475-1D09-C4AB-6B64-E395C632C67F}"/>
+              </a:ext>
+            </a:extLst>
+          </p:cNvPr>
+          <p:cNvSpPr/>
+          <p:nvPr/>
+        </p:nvSpPr>
+        <p:spPr>
+          <a:xfrm>
+            <a:off x="2882420" y="3496947"/>
+            <a:ext cx="1449805" cy="994375"/>
+          </a:xfrm>
+          <a:prstGeom prst="flowChartMultidocument">
+            <a:avLst/>
+          </a:prstGeom>
+          <a:solidFill>
+            <a:schemeClr val="accent4"/>
+          </a:solidFill>
+          <a:ln w="19050">
+            <a:solidFill>
+              <a:schemeClr val="accent1">
+                <a:lumMod val="75000"/>
+              </a:schemeClr>
+            </a:solidFill>
+          </a:ln>
+        </p:spPr>
+        <p:style>
+          <a:lnRef idx="2">
+            <a:schemeClr val="accent1">
+              <a:shade val="50000"/>
+            </a:schemeClr>
+          </a:lnRef>
+          <a:fillRef idx="1">
+            <a:schemeClr val="accent1"/>
+          </a:fillRef>
+          <a:effectRef idx="0">
+            <a:schemeClr val="accent1"/>
+          </a:effectRef>
+          <a:fontRef idx="minor">
+            <a:schemeClr val="lt1"/>
+          </a:fontRef>
+        </p:style>
+        <p:txBody>
+          <a:bodyPr rtlCol="0" anchor="ctr"/>
+          <a:lstStyle/>
+          <a:p>
+            <a:pPr marL="0" marR="0" lvl="0" indent="0" algn="ctr" defTabSz="914400" rtl="0" eaLnBrk="0" fontAlgn="base" latinLnBrk="0" hangingPunct="0">
+              <a:lnSpc>
+                <a:spcPct val="100000"/>
+              </a:lnSpc>
+              <a:spcBef>
+                <a:spcPct val="0"/>
+              </a:spcBef>
+              <a:spcAft>
+                <a:spcPct val="0"/>
+              </a:spcAft>
+              <a:buClrTx/>
+              <a:buSzTx/>
+              <a:buFontTx/>
+              <a:buNone/>
+              <a:tabLst/>
+              <a:defRPr/>
+            </a:pPr>
+            <a:r>
+              <a:rPr kumimoji="0" lang="en-US" sz="1200" b="0" i="0" u="none" strike="noStrike" kern="1200" cap="none" spc="0" normalizeH="0" baseline="0" noProof="0" dirty="0">
+                <a:ln>
+                  <a:noFill/>
+                </a:ln>
+                <a:solidFill>
+                  <a:schemeClr val="bg2">
+                    <a:lumMod val="25000"/>
+                  </a:schemeClr>
+                </a:solidFill>
+                <a:effectLst/>
+                <a:uLnTx/>
+                <a:uFillTx/>
+                <a:latin typeface="Calibri"/>
+                <a:ea typeface="+mn-ea"/>
+                <a:cs typeface="+mn-cs"/>
+              </a:rPr>
+              <a:t>*.</a:t>
+            </a:r>
+            <a:r>
+              <a:rPr kumimoji="0" lang="en-US" sz="1200" b="0" i="0" u="none" strike="noStrike" kern="1200" cap="none" spc="0" normalizeH="0" baseline="0" noProof="0" dirty="0" err="1">
+                <a:ln>
+                  <a:noFill/>
+                </a:ln>
+                <a:solidFill>
+                  <a:schemeClr val="bg2">
+                    <a:lumMod val="25000"/>
+                  </a:schemeClr>
+                </a:solidFill>
+                <a:effectLst/>
+                <a:uLnTx/>
+                <a:uFillTx/>
+                <a:latin typeface="Calibri"/>
+                <a:ea typeface="+mn-ea"/>
+                <a:cs typeface="+mn-cs"/>
+              </a:rPr>
+              <a:t>sds</a:t>
+            </a:r>
+            <a:r>
+              <a:rPr kumimoji="0" lang="en-US" sz="1200" b="0" i="0" u="none" strike="noStrike" kern="1200" cap="none" spc="0" normalizeH="0" baseline="0" noProof="0" dirty="0">
+                <a:ln>
+                  <a:noFill/>
+                </a:ln>
+                <a:solidFill>
+                  <a:schemeClr val="bg2">
+                    <a:lumMod val="25000"/>
+                  </a:schemeClr>
+                </a:solidFill>
+                <a:effectLst/>
+                <a:uLnTx/>
+                <a:uFillTx/>
+                <a:latin typeface="Calibri"/>
+                <a:ea typeface="+mn-ea"/>
+                <a:cs typeface="+mn-cs"/>
+              </a:rPr>
+              <a:t> Data Files</a:t>
+            </a:r>
+            <a:br>
+              <a:rPr kumimoji="0" lang="en-US" sz="1200" b="0" i="0" u="none" strike="noStrike" kern="1200" cap="none" spc="0" normalizeH="0" baseline="0" noProof="0" dirty="0">
+                <a:ln>
+                  <a:noFill/>
+                </a:ln>
+                <a:solidFill>
+                  <a:schemeClr val="bg2">
+                    <a:lumMod val="25000"/>
+                  </a:schemeClr>
+                </a:solidFill>
+                <a:effectLst/>
+                <a:uLnTx/>
+                <a:uFillTx/>
+                <a:latin typeface="Calibri"/>
+                <a:ea typeface="+mn-ea"/>
+                <a:cs typeface="+mn-cs"/>
+              </a:rPr>
+            </a:br>
+            <a:r>
+              <a:rPr kumimoji="0" lang="en-US" sz="1200" b="0" i="0" u="none" strike="noStrike" kern="1200" cap="none" spc="0" normalizeH="0" baseline="0" noProof="0" dirty="0">
+                <a:ln>
+                  <a:noFill/>
+                </a:ln>
+                <a:solidFill>
+                  <a:schemeClr val="bg2">
+                    <a:lumMod val="25000"/>
+                  </a:schemeClr>
+                </a:solidFill>
+                <a:effectLst/>
+                <a:uLnTx/>
+                <a:uFillTx/>
+                <a:latin typeface="Calibri"/>
+                <a:ea typeface="+mn-ea"/>
+                <a:cs typeface="+mn-cs"/>
+              </a:rPr>
+              <a:t>‘s</a:t>
+            </a:r>
+            <a:r>
+              <a:rPr lang="en-US" sz="1000" dirty="0">
+                <a:solidFill>
+                  <a:schemeClr val="bg2">
+                    <a:lumMod val="25000"/>
+                  </a:schemeClr>
+                </a:solidFill>
+                <a:latin typeface="Calibri"/>
+              </a:rPr>
+              <a:t>ensorX.0.sds’</a:t>
+            </a:r>
+            <a:br>
+              <a:rPr lang="en-US" sz="1000" dirty="0">
+                <a:solidFill>
+                  <a:schemeClr val="bg2">
+                    <a:lumMod val="25000"/>
+                  </a:schemeClr>
+                </a:solidFill>
+                <a:latin typeface="Calibri"/>
+              </a:rPr>
+            </a:br>
+            <a:r>
+              <a:rPr lang="en-US" sz="1000" dirty="0">
+                <a:solidFill>
+                  <a:schemeClr val="bg2">
+                    <a:lumMod val="25000"/>
+                  </a:schemeClr>
+                </a:solidFill>
+                <a:latin typeface="Calibri"/>
+              </a:rPr>
+              <a:t>‘sensorX.1.sds’</a:t>
+            </a:r>
+            <a:endParaRPr kumimoji="0" lang="en-US" sz="1000" b="0" i="0" u="none" strike="noStrike" kern="1200" cap="none" spc="0" normalizeH="0" baseline="0" noProof="0" dirty="0">
+              <a:ln>
+                <a:noFill/>
+              </a:ln>
+              <a:solidFill>
+                <a:schemeClr val="bg2">
+                  <a:lumMod val="25000"/>
+                </a:schemeClr>
+              </a:solidFill>
+              <a:effectLst/>
+              <a:uLnTx/>
+              <a:uFillTx/>
+              <a:latin typeface="Calibri"/>
+              <a:ea typeface="+mn-ea"/>
+              <a:cs typeface="+mn-cs"/>
+            </a:endParaRPr>
+          </a:p>
+        </p:txBody>
+      </p:sp>
+      <p:sp>
+        <p:nvSpPr>
+          <p:cNvPr id="8" name="Flowchart: Document 7">
+            <a:extLst>
+              <a:ext uri="{FF2B5EF4-FFF2-40B4-BE49-F238E27FC236}">
+                <a16:creationId xmlns:a16="http://schemas.microsoft.com/office/drawing/2014/main" id="{2A04F68D-B2C0-BBA3-DC16-05C7B017D06D}"/>
+              </a:ext>
+            </a:extLst>
+          </p:cNvPr>
+          <p:cNvSpPr/>
+          <p:nvPr/>
+        </p:nvSpPr>
+        <p:spPr>
+          <a:xfrm>
+            <a:off x="4724189" y="3496947"/>
+            <a:ext cx="1235868" cy="790196"/>
+          </a:xfrm>
+          <a:prstGeom prst="flowChartDocument">
+            <a:avLst/>
+          </a:prstGeom>
+          <a:solidFill>
+            <a:schemeClr val="accent5">
+              <a:lumMod val="75000"/>
+            </a:schemeClr>
+          </a:solidFill>
+          <a:ln>
+            <a:noFill/>
+          </a:ln>
+        </p:spPr>
+        <p:style>
+          <a:lnRef idx="2">
+            <a:schemeClr val="accent1">
+              <a:shade val="50000"/>
+            </a:schemeClr>
+          </a:lnRef>
+          <a:fillRef idx="1">
+            <a:schemeClr val="accent1"/>
+          </a:fillRef>
+          <a:effectRef idx="0">
+            <a:schemeClr val="accent1"/>
+          </a:effectRef>
+          <a:fontRef idx="minor">
+            <a:schemeClr val="lt1"/>
+          </a:fontRef>
+        </p:style>
+        <p:txBody>
+          <a:bodyPr rtlCol="0" anchor="ctr"/>
+          <a:lstStyle/>
+          <a:p>
+            <a:pPr algn="ctr"/>
+            <a:r>
+              <a:rPr lang="en-US" sz="1400"/>
+              <a:t>Meta Info</a:t>
+            </a:r>
+            <a:br>
+              <a:rPr lang="en-US" sz="1400"/>
+            </a:br>
+            <a:r>
+              <a:rPr lang="en-US" sz="1100"/>
+              <a:t>User supplied</a:t>
+            </a:r>
+            <a:br>
+              <a:rPr lang="en-US" sz="1400"/>
+            </a:br>
+            <a:r>
+              <a:rPr lang="en-US" sz="1100"/>
+              <a:t>‘</a:t>
+            </a:r>
+            <a:r>
+              <a:rPr lang="en-US" sz="1100" err="1"/>
+              <a:t>sensorX.sds.yml</a:t>
+            </a:r>
+            <a:r>
+              <a:rPr lang="en-US" sz="1100"/>
+              <a:t>’</a:t>
+            </a:r>
+            <a:endParaRPr lang="en-GB" sz="1400"/>
+          </a:p>
+        </p:txBody>
+      </p:sp>
+    </p:spTree>
+    <p:extLst>
+      <p:ext uri="{BB962C8B-B14F-4D97-AF65-F5344CB8AC3E}">
+        <p14:creationId xmlns:p14="http://schemas.microsoft.com/office/powerpoint/2010/main" val="1168348673"/>
       </p:ext>
     </p:extLst>
   </p:cSld>

</xml_diff>